<commit_message>
Update TuneScout_Poell_Obwexer.pptx with revised content
Revised the content in the presentation to reflect the latest updates. Ensured consistency and accuracy in the updated sections.
</commit_message>
<xml_diff>
--- a/TuneScout_Poell_Obwexer.pptx
+++ b/TuneScout_Poell_Obwexer.pptx
@@ -5,25 +5,24 @@
     <p:sldMasterId id="2147483660" r:id="rId1"/>
   </p:sldMasterIdLst>
   <p:notesMasterIdLst>
-    <p:notesMasterId r:id="rId15"/>
+    <p:notesMasterId r:id="rId14"/>
   </p:notesMasterIdLst>
   <p:handoutMasterIdLst>
-    <p:handoutMasterId r:id="rId16"/>
+    <p:handoutMasterId r:id="rId15"/>
   </p:handoutMasterIdLst>
   <p:sldIdLst>
     <p:sldId id="257" r:id="rId2"/>
-    <p:sldId id="258" r:id="rId3"/>
-    <p:sldId id="259" r:id="rId4"/>
-    <p:sldId id="264" r:id="rId5"/>
-    <p:sldId id="269" r:id="rId6"/>
-    <p:sldId id="260" r:id="rId7"/>
-    <p:sldId id="261" r:id="rId8"/>
-    <p:sldId id="265" r:id="rId9"/>
-    <p:sldId id="266" r:id="rId10"/>
-    <p:sldId id="267" r:id="rId11"/>
-    <p:sldId id="263" r:id="rId12"/>
-    <p:sldId id="262" r:id="rId13"/>
-    <p:sldId id="268" r:id="rId14"/>
+    <p:sldId id="259" r:id="rId3"/>
+    <p:sldId id="264" r:id="rId4"/>
+    <p:sldId id="269" r:id="rId5"/>
+    <p:sldId id="260" r:id="rId6"/>
+    <p:sldId id="261" r:id="rId7"/>
+    <p:sldId id="265" r:id="rId8"/>
+    <p:sldId id="266" r:id="rId9"/>
+    <p:sldId id="267" r:id="rId10"/>
+    <p:sldId id="263" r:id="rId11"/>
+    <p:sldId id="262" r:id="rId12"/>
+    <p:sldId id="268" r:id="rId13"/>
   </p:sldIdLst>
   <p:sldSz cx="9144000" cy="5715000" type="screen16x10"/>
   <p:notesSz cx="6858000" cy="9144000"/>
@@ -996,6 +995,42 @@
         </a:p>
       </dgm:t>
     </dgm:pt>
+    <dgm:pt modelId="{58BDD931-1032-45BC-A12D-DA722CB74AA9}">
+      <dgm:prSet phldrT="[Text]"/>
+      <dgm:spPr/>
+      <dgm:t>
+        <a:bodyPr/>
+        <a:lstStyle/>
+        <a:p>
+          <a:r>
+            <a:rPr lang="de-DE" dirty="0"/>
+            <a:t>Upload</a:t>
+          </a:r>
+        </a:p>
+      </dgm:t>
+    </dgm:pt>
+    <dgm:pt modelId="{75B1D64B-8013-4B46-9382-87E91BE3AFC5}" type="parTrans" cxnId="{930A5F10-8EE7-4B7D-8E75-587BC653647D}">
+      <dgm:prSet/>
+      <dgm:spPr/>
+      <dgm:t>
+        <a:bodyPr/>
+        <a:lstStyle/>
+        <a:p>
+          <a:endParaRPr lang="de-DE"/>
+        </a:p>
+      </dgm:t>
+    </dgm:pt>
+    <dgm:pt modelId="{4A832E0E-6CF1-4DA8-B50C-3119B6013C59}" type="sibTrans" cxnId="{930A5F10-8EE7-4B7D-8E75-587BC653647D}">
+      <dgm:prSet/>
+      <dgm:spPr/>
+      <dgm:t>
+        <a:bodyPr/>
+        <a:lstStyle/>
+        <a:p>
+          <a:endParaRPr lang="de-DE"/>
+        </a:p>
+      </dgm:t>
+    </dgm:pt>
     <dgm:pt modelId="{9A81C74A-3F90-46F5-889D-A0258EB9C0A5}" type="pres">
       <dgm:prSet presAssocID="{A51554B3-6711-4ACB-9B24-4354AF563C4A}" presName="Name0" presStyleCnt="0">
         <dgm:presLayoutVars>
@@ -1005,8 +1040,24 @@
       </dgm:prSet>
       <dgm:spPr/>
     </dgm:pt>
+    <dgm:pt modelId="{45B6188C-BCAC-4675-9EDC-E0D765A4F17A}" type="pres">
+      <dgm:prSet presAssocID="{58BDD931-1032-45BC-A12D-DA722CB74AA9}" presName="node" presStyleLbl="node1" presStyleIdx="0" presStyleCnt="4">
+        <dgm:presLayoutVars>
+          <dgm:bulletEnabled val="1"/>
+        </dgm:presLayoutVars>
+      </dgm:prSet>
+      <dgm:spPr/>
+    </dgm:pt>
+    <dgm:pt modelId="{990FD964-0EA2-442F-8695-232B981268C3}" type="pres">
+      <dgm:prSet presAssocID="{4A832E0E-6CF1-4DA8-B50C-3119B6013C59}" presName="sibTrans" presStyleLbl="sibTrans2D1" presStyleIdx="0" presStyleCnt="3"/>
+      <dgm:spPr/>
+    </dgm:pt>
+    <dgm:pt modelId="{E4AF5644-3B1E-4AF5-ACDE-C54995ED5408}" type="pres">
+      <dgm:prSet presAssocID="{4A832E0E-6CF1-4DA8-B50C-3119B6013C59}" presName="connectorText" presStyleLbl="sibTrans2D1" presStyleIdx="0" presStyleCnt="3"/>
+      <dgm:spPr/>
+    </dgm:pt>
     <dgm:pt modelId="{B031A21B-C7C7-4075-A437-0D3367483211}" type="pres">
-      <dgm:prSet presAssocID="{94BFA7BA-B120-447C-966B-5A3E93632602}" presName="node" presStyleLbl="node1" presStyleIdx="0" presStyleCnt="3">
+      <dgm:prSet presAssocID="{94BFA7BA-B120-447C-966B-5A3E93632602}" presName="node" presStyleLbl="node1" presStyleIdx="1" presStyleCnt="4">
         <dgm:presLayoutVars>
           <dgm:bulletEnabled val="1"/>
         </dgm:presLayoutVars>
@@ -1014,15 +1065,15 @@
       <dgm:spPr/>
     </dgm:pt>
     <dgm:pt modelId="{99D36FFF-4816-4B33-BDDC-E9CCD6734E40}" type="pres">
-      <dgm:prSet presAssocID="{79B0B043-4AD8-4C04-9F83-81C859977966}" presName="sibTrans" presStyleLbl="sibTrans2D1" presStyleIdx="0" presStyleCnt="2"/>
+      <dgm:prSet presAssocID="{79B0B043-4AD8-4C04-9F83-81C859977966}" presName="sibTrans" presStyleLbl="sibTrans2D1" presStyleIdx="1" presStyleCnt="3"/>
       <dgm:spPr/>
     </dgm:pt>
     <dgm:pt modelId="{AC84A763-1C12-457D-BB9C-8BB2A8C7BAD2}" type="pres">
-      <dgm:prSet presAssocID="{79B0B043-4AD8-4C04-9F83-81C859977966}" presName="connectorText" presStyleLbl="sibTrans2D1" presStyleIdx="0" presStyleCnt="2"/>
+      <dgm:prSet presAssocID="{79B0B043-4AD8-4C04-9F83-81C859977966}" presName="connectorText" presStyleLbl="sibTrans2D1" presStyleIdx="1" presStyleCnt="3"/>
       <dgm:spPr/>
     </dgm:pt>
     <dgm:pt modelId="{2CD7DF55-4F8E-40D7-83C8-7B953E74E5D8}" type="pres">
-      <dgm:prSet presAssocID="{29FB18CA-81EB-4DDB-949E-4831113A3986}" presName="node" presStyleLbl="node1" presStyleIdx="1" presStyleCnt="3">
+      <dgm:prSet presAssocID="{29FB18CA-81EB-4DDB-949E-4831113A3986}" presName="node" presStyleLbl="node1" presStyleIdx="2" presStyleCnt="4">
         <dgm:presLayoutVars>
           <dgm:bulletEnabled val="1"/>
         </dgm:presLayoutVars>
@@ -1030,15 +1081,15 @@
       <dgm:spPr/>
     </dgm:pt>
     <dgm:pt modelId="{9DB07DD1-C848-4125-8A36-7D14189D2DEE}" type="pres">
-      <dgm:prSet presAssocID="{B448B8A8-4E11-45E7-9043-83B99CB074CB}" presName="sibTrans" presStyleLbl="sibTrans2D1" presStyleIdx="1" presStyleCnt="2"/>
+      <dgm:prSet presAssocID="{B448B8A8-4E11-45E7-9043-83B99CB074CB}" presName="sibTrans" presStyleLbl="sibTrans2D1" presStyleIdx="2" presStyleCnt="3"/>
       <dgm:spPr/>
     </dgm:pt>
     <dgm:pt modelId="{B8B6E022-13E5-4EE0-AEFA-DFDCA0905519}" type="pres">
-      <dgm:prSet presAssocID="{B448B8A8-4E11-45E7-9043-83B99CB074CB}" presName="connectorText" presStyleLbl="sibTrans2D1" presStyleIdx="1" presStyleCnt="2"/>
+      <dgm:prSet presAssocID="{B448B8A8-4E11-45E7-9043-83B99CB074CB}" presName="connectorText" presStyleLbl="sibTrans2D1" presStyleIdx="2" presStyleCnt="3"/>
       <dgm:spPr/>
     </dgm:pt>
     <dgm:pt modelId="{065BC67F-9381-41D4-BEC0-122E713FB343}" type="pres">
-      <dgm:prSet presAssocID="{B2A69AFD-BBB3-4931-88BE-E38C5F0D7DF0}" presName="node" presStyleLbl="node1" presStyleIdx="2" presStyleCnt="3">
+      <dgm:prSet presAssocID="{B2A69AFD-BBB3-4931-88BE-E38C5F0D7DF0}" presName="node" presStyleLbl="node1" presStyleIdx="3" presStyleCnt="4">
         <dgm:presLayoutVars>
           <dgm:bulletEnabled val="1"/>
         </dgm:presLayoutVars>
@@ -1047,24 +1098,31 @@
     </dgm:pt>
   </dgm:ptLst>
   <dgm:cxnLst>
+    <dgm:cxn modelId="{930A5F10-8EE7-4B7D-8E75-587BC653647D}" srcId="{A51554B3-6711-4ACB-9B24-4354AF563C4A}" destId="{58BDD931-1032-45BC-A12D-DA722CB74AA9}" srcOrd="0" destOrd="0" parTransId="{75B1D64B-8013-4B46-9382-87E91BE3AFC5}" sibTransId="{4A832E0E-6CF1-4DA8-B50C-3119B6013C59}"/>
+    <dgm:cxn modelId="{1BB26023-CF36-4C33-A051-423EE44F5D77}" type="presOf" srcId="{4A832E0E-6CF1-4DA8-B50C-3119B6013C59}" destId="{990FD964-0EA2-442F-8695-232B981268C3}" srcOrd="0" destOrd="0" presId="urn:microsoft.com/office/officeart/2005/8/layout/process1"/>
     <dgm:cxn modelId="{0353A228-F18C-400E-A80C-51A09E740DC4}" type="presOf" srcId="{79B0B043-4AD8-4C04-9F83-81C859977966}" destId="{AC84A763-1C12-457D-BB9C-8BB2A8C7BAD2}" srcOrd="1" destOrd="0" presId="urn:microsoft.com/office/officeart/2005/8/layout/process1"/>
+    <dgm:cxn modelId="{AEA4B264-E66B-4480-9905-A78F743662F4}" type="presOf" srcId="{58BDD931-1032-45BC-A12D-DA722CB74AA9}" destId="{45B6188C-BCAC-4675-9EDC-E0D765A4F17A}" srcOrd="0" destOrd="0" presId="urn:microsoft.com/office/officeart/2005/8/layout/process1"/>
     <dgm:cxn modelId="{4EF9446D-6DB7-40DF-8C53-ACD81D756B73}" type="presOf" srcId="{B2A69AFD-BBB3-4931-88BE-E38C5F0D7DF0}" destId="{065BC67F-9381-41D4-BEC0-122E713FB343}" srcOrd="0" destOrd="0" presId="urn:microsoft.com/office/officeart/2005/8/layout/process1"/>
-    <dgm:cxn modelId="{9B628752-50C5-4A17-BB7C-707127B75CD8}" srcId="{A51554B3-6711-4ACB-9B24-4354AF563C4A}" destId="{94BFA7BA-B120-447C-966B-5A3E93632602}" srcOrd="0" destOrd="0" parTransId="{929F65AF-3205-461D-B895-E91A9F87D13D}" sibTransId="{79B0B043-4AD8-4C04-9F83-81C859977966}"/>
+    <dgm:cxn modelId="{9B628752-50C5-4A17-BB7C-707127B75CD8}" srcId="{A51554B3-6711-4ACB-9B24-4354AF563C4A}" destId="{94BFA7BA-B120-447C-966B-5A3E93632602}" srcOrd="1" destOrd="0" parTransId="{929F65AF-3205-461D-B895-E91A9F87D13D}" sibTransId="{79B0B043-4AD8-4C04-9F83-81C859977966}"/>
     <dgm:cxn modelId="{33154797-7A13-491C-9C18-027BFF3CBFB8}" type="presOf" srcId="{94BFA7BA-B120-447C-966B-5A3E93632602}" destId="{B031A21B-C7C7-4075-A437-0D3367483211}" srcOrd="0" destOrd="0" presId="urn:microsoft.com/office/officeart/2005/8/layout/process1"/>
-    <dgm:cxn modelId="{B30B219C-C324-4CD6-B663-7E523F678E44}" srcId="{A51554B3-6711-4ACB-9B24-4354AF563C4A}" destId="{29FB18CA-81EB-4DDB-949E-4831113A3986}" srcOrd="1" destOrd="0" parTransId="{3DFED1FC-DE67-4411-8E17-ED7F9C9EEF14}" sibTransId="{B448B8A8-4E11-45E7-9043-83B99CB074CB}"/>
-    <dgm:cxn modelId="{1F36FDA0-C546-46E5-9A19-5F4061BE7F74}" srcId="{A51554B3-6711-4ACB-9B24-4354AF563C4A}" destId="{B2A69AFD-BBB3-4931-88BE-E38C5F0D7DF0}" srcOrd="2" destOrd="0" parTransId="{01C98AD5-FFB5-46AD-A4B5-67C0C5677F27}" sibTransId="{69F93E15-72B6-47AF-8F92-DD5BF9B08B37}"/>
+    <dgm:cxn modelId="{B30B219C-C324-4CD6-B663-7E523F678E44}" srcId="{A51554B3-6711-4ACB-9B24-4354AF563C4A}" destId="{29FB18CA-81EB-4DDB-949E-4831113A3986}" srcOrd="2" destOrd="0" parTransId="{3DFED1FC-DE67-4411-8E17-ED7F9C9EEF14}" sibTransId="{B448B8A8-4E11-45E7-9043-83B99CB074CB}"/>
+    <dgm:cxn modelId="{1F36FDA0-C546-46E5-9A19-5F4061BE7F74}" srcId="{A51554B3-6711-4ACB-9B24-4354AF563C4A}" destId="{B2A69AFD-BBB3-4931-88BE-E38C5F0D7DF0}" srcOrd="3" destOrd="0" parTransId="{01C98AD5-FFB5-46AD-A4B5-67C0C5677F27}" sibTransId="{69F93E15-72B6-47AF-8F92-DD5BF9B08B37}"/>
     <dgm:cxn modelId="{6F7DB9AC-7E63-4BCE-B88C-798DC72C519C}" type="presOf" srcId="{A51554B3-6711-4ACB-9B24-4354AF563C4A}" destId="{9A81C74A-3F90-46F5-889D-A0258EB9C0A5}" srcOrd="0" destOrd="0" presId="urn:microsoft.com/office/officeart/2005/8/layout/process1"/>
     <dgm:cxn modelId="{13125DDF-EE35-42DA-85CD-76D219F88B11}" type="presOf" srcId="{B448B8A8-4E11-45E7-9043-83B99CB074CB}" destId="{9DB07DD1-C848-4125-8A36-7D14189D2DEE}" srcOrd="0" destOrd="0" presId="urn:microsoft.com/office/officeart/2005/8/layout/process1"/>
     <dgm:cxn modelId="{ECFF72ED-A195-4105-A86D-658503EFA742}" type="presOf" srcId="{29FB18CA-81EB-4DDB-949E-4831113A3986}" destId="{2CD7DF55-4F8E-40D7-83C8-7B953E74E5D8}" srcOrd="0" destOrd="0" presId="urn:microsoft.com/office/officeart/2005/8/layout/process1"/>
+    <dgm:cxn modelId="{5D5872FB-E5FB-4A3A-AAF0-95F35E6E9814}" type="presOf" srcId="{4A832E0E-6CF1-4DA8-B50C-3119B6013C59}" destId="{E4AF5644-3B1E-4AF5-ACDE-C54995ED5408}" srcOrd="1" destOrd="0" presId="urn:microsoft.com/office/officeart/2005/8/layout/process1"/>
     <dgm:cxn modelId="{59D8AAFB-3193-4A6F-90EE-1D3977613C52}" type="presOf" srcId="{79B0B043-4AD8-4C04-9F83-81C859977966}" destId="{99D36FFF-4816-4B33-BDDC-E9CCD6734E40}" srcOrd="0" destOrd="0" presId="urn:microsoft.com/office/officeart/2005/8/layout/process1"/>
     <dgm:cxn modelId="{AA4F89FC-F970-4397-88DC-B4A0B64BE28C}" type="presOf" srcId="{B448B8A8-4E11-45E7-9043-83B99CB074CB}" destId="{B8B6E022-13E5-4EE0-AEFA-DFDCA0905519}" srcOrd="1" destOrd="0" presId="urn:microsoft.com/office/officeart/2005/8/layout/process1"/>
-    <dgm:cxn modelId="{C52926C6-3299-41E1-A036-5632BD33270E}" type="presParOf" srcId="{9A81C74A-3F90-46F5-889D-A0258EB9C0A5}" destId="{B031A21B-C7C7-4075-A437-0D3367483211}" srcOrd="0" destOrd="0" presId="urn:microsoft.com/office/officeart/2005/8/layout/process1"/>
-    <dgm:cxn modelId="{ABDC04BA-6951-4431-8438-413286FE8A84}" type="presParOf" srcId="{9A81C74A-3F90-46F5-889D-A0258EB9C0A5}" destId="{99D36FFF-4816-4B33-BDDC-E9CCD6734E40}" srcOrd="1" destOrd="0" presId="urn:microsoft.com/office/officeart/2005/8/layout/process1"/>
+    <dgm:cxn modelId="{6894E5B2-8118-49FE-B6F4-63C21DE0C81E}" type="presParOf" srcId="{9A81C74A-3F90-46F5-889D-A0258EB9C0A5}" destId="{45B6188C-BCAC-4675-9EDC-E0D765A4F17A}" srcOrd="0" destOrd="0" presId="urn:microsoft.com/office/officeart/2005/8/layout/process1"/>
+    <dgm:cxn modelId="{F7144FEE-2227-46B8-B1C4-27D1A737B882}" type="presParOf" srcId="{9A81C74A-3F90-46F5-889D-A0258EB9C0A5}" destId="{990FD964-0EA2-442F-8695-232B981268C3}" srcOrd="1" destOrd="0" presId="urn:microsoft.com/office/officeart/2005/8/layout/process1"/>
+    <dgm:cxn modelId="{2C6B1178-698D-48AE-8FEB-F5C7AF1B03C7}" type="presParOf" srcId="{990FD964-0EA2-442F-8695-232B981268C3}" destId="{E4AF5644-3B1E-4AF5-ACDE-C54995ED5408}" srcOrd="0" destOrd="0" presId="urn:microsoft.com/office/officeart/2005/8/layout/process1"/>
+    <dgm:cxn modelId="{C52926C6-3299-41E1-A036-5632BD33270E}" type="presParOf" srcId="{9A81C74A-3F90-46F5-889D-A0258EB9C0A5}" destId="{B031A21B-C7C7-4075-A437-0D3367483211}" srcOrd="2" destOrd="0" presId="urn:microsoft.com/office/officeart/2005/8/layout/process1"/>
+    <dgm:cxn modelId="{ABDC04BA-6951-4431-8438-413286FE8A84}" type="presParOf" srcId="{9A81C74A-3F90-46F5-889D-A0258EB9C0A5}" destId="{99D36FFF-4816-4B33-BDDC-E9CCD6734E40}" srcOrd="3" destOrd="0" presId="urn:microsoft.com/office/officeart/2005/8/layout/process1"/>
     <dgm:cxn modelId="{820921AF-1AF5-48C7-B590-D8872681D441}" type="presParOf" srcId="{99D36FFF-4816-4B33-BDDC-E9CCD6734E40}" destId="{AC84A763-1C12-457D-BB9C-8BB2A8C7BAD2}" srcOrd="0" destOrd="0" presId="urn:microsoft.com/office/officeart/2005/8/layout/process1"/>
-    <dgm:cxn modelId="{01ACB0BF-B04B-40DA-8A0D-F9718C099A6F}" type="presParOf" srcId="{9A81C74A-3F90-46F5-889D-A0258EB9C0A5}" destId="{2CD7DF55-4F8E-40D7-83C8-7B953E74E5D8}" srcOrd="2" destOrd="0" presId="urn:microsoft.com/office/officeart/2005/8/layout/process1"/>
-    <dgm:cxn modelId="{986B98BD-E69B-4A7B-8A8E-0249A24D369A}" type="presParOf" srcId="{9A81C74A-3F90-46F5-889D-A0258EB9C0A5}" destId="{9DB07DD1-C848-4125-8A36-7D14189D2DEE}" srcOrd="3" destOrd="0" presId="urn:microsoft.com/office/officeart/2005/8/layout/process1"/>
+    <dgm:cxn modelId="{01ACB0BF-B04B-40DA-8A0D-F9718C099A6F}" type="presParOf" srcId="{9A81C74A-3F90-46F5-889D-A0258EB9C0A5}" destId="{2CD7DF55-4F8E-40D7-83C8-7B953E74E5D8}" srcOrd="4" destOrd="0" presId="urn:microsoft.com/office/officeart/2005/8/layout/process1"/>
+    <dgm:cxn modelId="{986B98BD-E69B-4A7B-8A8E-0249A24D369A}" type="presParOf" srcId="{9A81C74A-3F90-46F5-889D-A0258EB9C0A5}" destId="{9DB07DD1-C848-4125-8A36-7D14189D2DEE}" srcOrd="5" destOrd="0" presId="urn:microsoft.com/office/officeart/2005/8/layout/process1"/>
     <dgm:cxn modelId="{61F02FDA-F0CB-4CE5-8A94-6D686D5CE6CC}" type="presParOf" srcId="{9DB07DD1-C848-4125-8A36-7D14189D2DEE}" destId="{B8B6E022-13E5-4EE0-AEFA-DFDCA0905519}" srcOrd="0" destOrd="0" presId="urn:microsoft.com/office/officeart/2005/8/layout/process1"/>
-    <dgm:cxn modelId="{0FC7A445-F4E7-4B02-84C6-5D41C2D6F093}" type="presParOf" srcId="{9A81C74A-3F90-46F5-889D-A0258EB9C0A5}" destId="{065BC67F-9381-41D4-BEC0-122E713FB343}" srcOrd="4" destOrd="0" presId="urn:microsoft.com/office/officeart/2005/8/layout/process1"/>
+    <dgm:cxn modelId="{0FC7A445-F4E7-4B02-84C6-5D41C2D6F093}" type="presParOf" srcId="{9A81C74A-3F90-46F5-889D-A0258EB9C0A5}" destId="{065BC67F-9381-41D4-BEC0-122E713FB343}" srcOrd="6" destOrd="0" presId="urn:microsoft.com/office/officeart/2005/8/layout/process1"/>
   </dgm:cxnLst>
   <dgm:bg/>
   <dgm:whole/>
@@ -1084,15 +1142,15 @@
       <dsp:cNvGrpSpPr/>
     </dsp:nvGrpSpPr>
     <dsp:grpSpPr/>
-    <dsp:sp modelId="{B031A21B-C7C7-4075-A437-0D3367483211}">
+    <dsp:sp modelId="{45B6188C-BCAC-4675-9EDC-E0D765A4F17A}">
       <dsp:nvSpPr>
         <dsp:cNvPr id="0" name=""/>
         <dsp:cNvSpPr/>
       </dsp:nvSpPr>
       <dsp:spPr>
         <a:xfrm>
-          <a:off x="6634" y="1293439"/>
-          <a:ext cx="1982972" cy="1189783"/>
+          <a:off x="3317" y="1453220"/>
+          <a:ext cx="1450370" cy="870222"/>
         </a:xfrm>
         <a:prstGeom prst="roundRect">
           <a:avLst>
@@ -1136,12 +1194,12 @@
         </a:fontRef>
       </dsp:style>
       <dsp:txBody>
-        <a:bodyPr spcFirstLastPara="0" vert="horz" wrap="square" lIns="64770" tIns="64770" rIns="64770" bIns="64770" numCol="1" spcCol="1270" anchor="ctr" anchorCtr="0">
+        <a:bodyPr spcFirstLastPara="0" vert="horz" wrap="square" lIns="45720" tIns="45720" rIns="45720" bIns="45720" numCol="1" spcCol="1270" anchor="ctr" anchorCtr="0">
           <a:noAutofit/>
         </a:bodyPr>
         <a:lstStyle/>
         <a:p>
-          <a:pPr marL="0" lvl="0" indent="0" algn="ctr" defTabSz="755650">
+          <a:pPr marL="0" lvl="0" indent="0" algn="ctr" defTabSz="533400">
             <a:lnSpc>
               <a:spcPct val="90000"/>
             </a:lnSpc>
@@ -1154,25 +1212,25 @@
             <a:buNone/>
           </a:pPr>
           <a:r>
-            <a:rPr lang="de-DE" sz="1700" kern="1200" dirty="0"/>
-            <a:t>Audioverarbeitung</a:t>
+            <a:rPr lang="de-DE" sz="1200" kern="1200" dirty="0"/>
+            <a:t>Upload</a:t>
           </a:r>
         </a:p>
       </dsp:txBody>
       <dsp:txXfrm>
-        <a:off x="41482" y="1328287"/>
-        <a:ext cx="1913276" cy="1120087"/>
+        <a:off x="28805" y="1478708"/>
+        <a:ext cx="1399394" cy="819246"/>
       </dsp:txXfrm>
     </dsp:sp>
-    <dsp:sp modelId="{99D36FFF-4816-4B33-BDDC-E9CCD6734E40}">
+    <dsp:sp modelId="{990FD964-0EA2-442F-8695-232B981268C3}">
       <dsp:nvSpPr>
         <dsp:cNvPr id="0" name=""/>
         <dsp:cNvSpPr/>
       </dsp:nvSpPr>
       <dsp:spPr>
         <a:xfrm>
-          <a:off x="2187903" y="1642442"/>
-          <a:ext cx="420390" cy="491777"/>
+          <a:off x="1598725" y="1708485"/>
+          <a:ext cx="307478" cy="359691"/>
         </a:xfrm>
         <a:prstGeom prst="rightArrow">
           <a:avLst>
@@ -1214,7 +1272,7 @@
         </a:bodyPr>
         <a:lstStyle/>
         <a:p>
-          <a:pPr marL="0" lvl="0" indent="0" algn="ctr" defTabSz="622300">
+          <a:pPr marL="0" lvl="0" indent="0" algn="ctr" defTabSz="444500">
             <a:lnSpc>
               <a:spcPct val="90000"/>
             </a:lnSpc>
@@ -1226,23 +1284,23 @@
             </a:spcAft>
             <a:buNone/>
           </a:pPr>
-          <a:endParaRPr lang="de-DE" sz="1400" kern="1200"/>
+          <a:endParaRPr lang="de-DE" sz="1000" kern="1200"/>
         </a:p>
       </dsp:txBody>
       <dsp:txXfrm>
-        <a:off x="2187903" y="1740797"/>
-        <a:ext cx="294273" cy="295067"/>
+        <a:off x="1598725" y="1780423"/>
+        <a:ext cx="215235" cy="215815"/>
       </dsp:txXfrm>
     </dsp:sp>
-    <dsp:sp modelId="{2CD7DF55-4F8E-40D7-83C8-7B953E74E5D8}">
+    <dsp:sp modelId="{B031A21B-C7C7-4075-A437-0D3367483211}">
       <dsp:nvSpPr>
         <dsp:cNvPr id="0" name=""/>
         <dsp:cNvSpPr/>
       </dsp:nvSpPr>
       <dsp:spPr>
         <a:xfrm>
-          <a:off x="2782795" y="1293439"/>
-          <a:ext cx="1982972" cy="1189783"/>
+          <a:off x="2033836" y="1453220"/>
+          <a:ext cx="1450370" cy="870222"/>
         </a:xfrm>
         <a:prstGeom prst="roundRect">
           <a:avLst>
@@ -1286,12 +1344,12 @@
         </a:fontRef>
       </dsp:style>
       <dsp:txBody>
-        <a:bodyPr spcFirstLastPara="0" vert="horz" wrap="square" lIns="64770" tIns="64770" rIns="64770" bIns="64770" numCol="1" spcCol="1270" anchor="ctr" anchorCtr="0">
+        <a:bodyPr spcFirstLastPara="0" vert="horz" wrap="square" lIns="45720" tIns="45720" rIns="45720" bIns="45720" numCol="1" spcCol="1270" anchor="ctr" anchorCtr="0">
           <a:noAutofit/>
         </a:bodyPr>
         <a:lstStyle/>
         <a:p>
-          <a:pPr marL="0" lvl="0" indent="0" algn="ctr" defTabSz="755650">
+          <a:pPr marL="0" lvl="0" indent="0" algn="ctr" defTabSz="533400">
             <a:lnSpc>
               <a:spcPct val="90000"/>
             </a:lnSpc>
@@ -1304,26 +1362,25 @@
             <a:buNone/>
           </a:pPr>
           <a:r>
-            <a:rPr lang="de-DE" sz="1700" kern="1200" dirty="0" err="1"/>
-            <a:t>Hashing</a:t>
+            <a:rPr lang="de-DE" sz="1200" kern="1200" dirty="0"/>
+            <a:t>Audioverarbeitung</a:t>
           </a:r>
-          <a:endParaRPr lang="de-DE" sz="1700" kern="1200" dirty="0"/>
         </a:p>
       </dsp:txBody>
       <dsp:txXfrm>
-        <a:off x="2817643" y="1328287"/>
-        <a:ext cx="1913276" cy="1120087"/>
+        <a:off x="2059324" y="1478708"/>
+        <a:ext cx="1399394" cy="819246"/>
       </dsp:txXfrm>
     </dsp:sp>
-    <dsp:sp modelId="{9DB07DD1-C848-4125-8A36-7D14189D2DEE}">
+    <dsp:sp modelId="{99D36FFF-4816-4B33-BDDC-E9CCD6734E40}">
       <dsp:nvSpPr>
         <dsp:cNvPr id="0" name=""/>
         <dsp:cNvSpPr/>
       </dsp:nvSpPr>
       <dsp:spPr>
         <a:xfrm>
-          <a:off x="4964064" y="1642442"/>
-          <a:ext cx="420390" cy="491777"/>
+          <a:off x="3629244" y="1708485"/>
+          <a:ext cx="307478" cy="359691"/>
         </a:xfrm>
         <a:prstGeom prst="rightArrow">
           <a:avLst>
@@ -1365,7 +1422,7 @@
         </a:bodyPr>
         <a:lstStyle/>
         <a:p>
-          <a:pPr marL="0" lvl="0" indent="0" algn="ctr" defTabSz="622300">
+          <a:pPr marL="0" lvl="0" indent="0" algn="ctr" defTabSz="444500">
             <a:lnSpc>
               <a:spcPct val="90000"/>
             </a:lnSpc>
@@ -1377,23 +1434,23 @@
             </a:spcAft>
             <a:buNone/>
           </a:pPr>
-          <a:endParaRPr lang="de-DE" sz="1400" kern="1200"/>
+          <a:endParaRPr lang="de-DE" sz="1000" kern="1200"/>
         </a:p>
       </dsp:txBody>
       <dsp:txXfrm>
-        <a:off x="4964064" y="1740797"/>
-        <a:ext cx="294273" cy="295067"/>
+        <a:off x="3629244" y="1780423"/>
+        <a:ext cx="215235" cy="215815"/>
       </dsp:txXfrm>
     </dsp:sp>
-    <dsp:sp modelId="{065BC67F-9381-41D4-BEC0-122E713FB343}">
+    <dsp:sp modelId="{2CD7DF55-4F8E-40D7-83C8-7B953E74E5D8}">
       <dsp:nvSpPr>
         <dsp:cNvPr id="0" name=""/>
         <dsp:cNvSpPr/>
       </dsp:nvSpPr>
       <dsp:spPr>
         <a:xfrm>
-          <a:off x="5558956" y="1293439"/>
-          <a:ext cx="1982972" cy="1189783"/>
+          <a:off x="4064355" y="1453220"/>
+          <a:ext cx="1450370" cy="870222"/>
         </a:xfrm>
         <a:prstGeom prst="roundRect">
           <a:avLst>
@@ -1437,12 +1494,12 @@
         </a:fontRef>
       </dsp:style>
       <dsp:txBody>
-        <a:bodyPr spcFirstLastPara="0" vert="horz" wrap="square" lIns="64770" tIns="64770" rIns="64770" bIns="64770" numCol="1" spcCol="1270" anchor="ctr" anchorCtr="0">
+        <a:bodyPr spcFirstLastPara="0" vert="horz" wrap="square" lIns="45720" tIns="45720" rIns="45720" bIns="45720" numCol="1" spcCol="1270" anchor="ctr" anchorCtr="0">
           <a:noAutofit/>
         </a:bodyPr>
         <a:lstStyle/>
         <a:p>
-          <a:pPr marL="0" lvl="0" indent="0" algn="ctr" defTabSz="755650">
+          <a:pPr marL="0" lvl="0" indent="0" algn="ctr" defTabSz="533400">
             <a:lnSpc>
               <a:spcPct val="90000"/>
             </a:lnSpc>
@@ -1455,14 +1512,165 @@
             <a:buNone/>
           </a:pPr>
           <a:r>
-            <a:rPr lang="de-DE" sz="1700" kern="1200" dirty="0"/>
+            <a:rPr lang="de-DE" sz="1200" kern="1200" dirty="0" err="1"/>
+            <a:t>Hashing</a:t>
+          </a:r>
+          <a:endParaRPr lang="de-DE" sz="1200" kern="1200" dirty="0"/>
+        </a:p>
+      </dsp:txBody>
+      <dsp:txXfrm>
+        <a:off x="4089843" y="1478708"/>
+        <a:ext cx="1399394" cy="819246"/>
+      </dsp:txXfrm>
+    </dsp:sp>
+    <dsp:sp modelId="{9DB07DD1-C848-4125-8A36-7D14189D2DEE}">
+      <dsp:nvSpPr>
+        <dsp:cNvPr id="0" name=""/>
+        <dsp:cNvSpPr/>
+      </dsp:nvSpPr>
+      <dsp:spPr>
+        <a:xfrm>
+          <a:off x="5659763" y="1708485"/>
+          <a:ext cx="307478" cy="359691"/>
+        </a:xfrm>
+        <a:prstGeom prst="rightArrow">
+          <a:avLst>
+            <a:gd name="adj1" fmla="val 60000"/>
+            <a:gd name="adj2" fmla="val 50000"/>
+          </a:avLst>
+        </a:prstGeom>
+        <a:solidFill>
+          <a:schemeClr val="accent1">
+            <a:tint val="60000"/>
+            <a:hueOff val="0"/>
+            <a:satOff val="0"/>
+            <a:lumOff val="0"/>
+            <a:alphaOff val="0"/>
+          </a:schemeClr>
+        </a:solidFill>
+        <a:ln>
+          <a:noFill/>
+        </a:ln>
+        <a:effectLst/>
+      </dsp:spPr>
+      <dsp:style>
+        <a:lnRef idx="0">
+          <a:scrgbClr r="0" g="0" b="0"/>
+        </a:lnRef>
+        <a:fillRef idx="1">
+          <a:scrgbClr r="0" g="0" b="0"/>
+        </a:fillRef>
+        <a:effectRef idx="0">
+          <a:scrgbClr r="0" g="0" b="0"/>
+        </a:effectRef>
+        <a:fontRef idx="minor">
+          <a:schemeClr val="lt1"/>
+        </a:fontRef>
+      </dsp:style>
+      <dsp:txBody>
+        <a:bodyPr spcFirstLastPara="0" vert="horz" wrap="square" lIns="0" tIns="0" rIns="0" bIns="0" numCol="1" spcCol="1270" anchor="ctr" anchorCtr="0">
+          <a:noAutofit/>
+        </a:bodyPr>
+        <a:lstStyle/>
+        <a:p>
+          <a:pPr marL="0" lvl="0" indent="0" algn="ctr" defTabSz="444500">
+            <a:lnSpc>
+              <a:spcPct val="90000"/>
+            </a:lnSpc>
+            <a:spcBef>
+              <a:spcPct val="0"/>
+            </a:spcBef>
+            <a:spcAft>
+              <a:spcPct val="35000"/>
+            </a:spcAft>
+            <a:buNone/>
+          </a:pPr>
+          <a:endParaRPr lang="de-DE" sz="1000" kern="1200"/>
+        </a:p>
+      </dsp:txBody>
+      <dsp:txXfrm>
+        <a:off x="5659763" y="1780423"/>
+        <a:ext cx="215235" cy="215815"/>
+      </dsp:txXfrm>
+    </dsp:sp>
+    <dsp:sp modelId="{065BC67F-9381-41D4-BEC0-122E713FB343}">
+      <dsp:nvSpPr>
+        <dsp:cNvPr id="0" name=""/>
+        <dsp:cNvSpPr/>
+      </dsp:nvSpPr>
+      <dsp:spPr>
+        <a:xfrm>
+          <a:off x="6094874" y="1453220"/>
+          <a:ext cx="1450370" cy="870222"/>
+        </a:xfrm>
+        <a:prstGeom prst="roundRect">
+          <a:avLst>
+            <a:gd name="adj" fmla="val 10000"/>
+          </a:avLst>
+        </a:prstGeom>
+        <a:solidFill>
+          <a:schemeClr val="accent1">
+            <a:hueOff val="0"/>
+            <a:satOff val="0"/>
+            <a:lumOff val="0"/>
+            <a:alphaOff val="0"/>
+          </a:schemeClr>
+        </a:solidFill>
+        <a:ln w="12700" cap="flat" cmpd="sng" algn="ctr">
+          <a:solidFill>
+            <a:schemeClr val="lt1">
+              <a:hueOff val="0"/>
+              <a:satOff val="0"/>
+              <a:lumOff val="0"/>
+              <a:alphaOff val="0"/>
+            </a:schemeClr>
+          </a:solidFill>
+          <a:prstDash val="solid"/>
+          <a:miter lim="800000"/>
+        </a:ln>
+        <a:effectLst/>
+      </dsp:spPr>
+      <dsp:style>
+        <a:lnRef idx="2">
+          <a:scrgbClr r="0" g="0" b="0"/>
+        </a:lnRef>
+        <a:fillRef idx="1">
+          <a:scrgbClr r="0" g="0" b="0"/>
+        </a:fillRef>
+        <a:effectRef idx="0">
+          <a:scrgbClr r="0" g="0" b="0"/>
+        </a:effectRef>
+        <a:fontRef idx="minor">
+          <a:schemeClr val="lt1"/>
+        </a:fontRef>
+      </dsp:style>
+      <dsp:txBody>
+        <a:bodyPr spcFirstLastPara="0" vert="horz" wrap="square" lIns="45720" tIns="45720" rIns="45720" bIns="45720" numCol="1" spcCol="1270" anchor="ctr" anchorCtr="0">
+          <a:noAutofit/>
+        </a:bodyPr>
+        <a:lstStyle/>
+        <a:p>
+          <a:pPr marL="0" lvl="0" indent="0" algn="ctr" defTabSz="533400">
+            <a:lnSpc>
+              <a:spcPct val="90000"/>
+            </a:lnSpc>
+            <a:spcBef>
+              <a:spcPct val="0"/>
+            </a:spcBef>
+            <a:spcAft>
+              <a:spcPct val="35000"/>
+            </a:spcAft>
+            <a:buNone/>
+          </a:pPr>
+          <a:r>
+            <a:rPr lang="de-DE" sz="1200" kern="1200" dirty="0"/>
             <a:t>Speichern</a:t>
           </a:r>
         </a:p>
       </dsp:txBody>
       <dsp:txXfrm>
-        <a:off x="5593804" y="1328287"/>
-        <a:ext cx="1913276" cy="1120087"/>
+        <a:off x="6120362" y="1478708"/>
+        <a:ext cx="1399394" cy="819246"/>
       </dsp:txXfrm>
     </dsp:sp>
   </dsp:spTree>
@@ -6597,129 +6805,6 @@
   <p:cSld>
     <p:spTree>
       <p:nvGrpSpPr>
-        <p:cNvPr id="1" name=""/>
-        <p:cNvGrpSpPr/>
-        <p:nvPr/>
-      </p:nvGrpSpPr>
-      <p:grpSpPr>
-        <a:xfrm>
-          <a:off x="0" y="0"/>
-          <a:ext cx="0" cy="0"/>
-          <a:chOff x="0" y="0"/>
-          <a:chExt cx="0" cy="0"/>
-        </a:xfrm>
-      </p:grpSpPr>
-      <p:sp>
-        <p:nvSpPr>
-          <p:cNvPr id="2" name="Inhaltsplatzhalter 1">
-            <a:extLst>
-              <a:ext uri="{FF2B5EF4-FFF2-40B4-BE49-F238E27FC236}">
-                <a16:creationId xmlns:a16="http://schemas.microsoft.com/office/drawing/2014/main" id="{AD7D2038-7134-1234-8267-584524B9C159}"/>
-              </a:ext>
-            </a:extLst>
-          </p:cNvPr>
-          <p:cNvSpPr>
-            <a:spLocks noGrp="1"/>
-          </p:cNvSpPr>
-          <p:nvPr>
-            <p:ph idx="1"/>
-          </p:nvPr>
-        </p:nvSpPr>
-        <p:spPr/>
-        <p:txBody>
-          <a:bodyPr/>
-          <a:lstStyle/>
-          <a:p>
-            <a:r>
-              <a:rPr lang="de-DE" dirty="0"/>
-              <a:t>Admin Keys -&gt; lokal gespeichert</a:t>
-            </a:r>
-          </a:p>
-          <a:p>
-            <a:r>
-              <a:rPr lang="de-DE" dirty="0" err="1"/>
-              <a:t>Settings.toml</a:t>
-            </a:r>
-            <a:r>
-              <a:rPr lang="de-DE" dirty="0"/>
-              <a:t> alle Informationen gespeichert</a:t>
-            </a:r>
-          </a:p>
-          <a:p>
-            <a:r>
-              <a:rPr lang="de-DE" dirty="0"/>
-              <a:t>In .</a:t>
-            </a:r>
-            <a:r>
-              <a:rPr lang="de-DE" dirty="0" err="1"/>
-              <a:t>gitignore</a:t>
-            </a:r>
-            <a:r>
-              <a:rPr lang="de-DE" dirty="0"/>
-              <a:t> eingebunden</a:t>
-            </a:r>
-          </a:p>
-          <a:p>
-            <a:r>
-              <a:rPr lang="de-DE" dirty="0" err="1"/>
-              <a:t>WebApp</a:t>
-            </a:r>
-            <a:r>
-              <a:rPr lang="de-DE" dirty="0"/>
-              <a:t> nur Leseberechtigung</a:t>
-            </a:r>
-          </a:p>
-          <a:p>
-            <a:endParaRPr lang="de-DE" dirty="0"/>
-          </a:p>
-        </p:txBody>
-      </p:sp>
-      <p:sp>
-        <p:nvSpPr>
-          <p:cNvPr id="3" name="Titel 2">
-            <a:extLst>
-              <a:ext uri="{FF2B5EF4-FFF2-40B4-BE49-F238E27FC236}">
-                <a16:creationId xmlns:a16="http://schemas.microsoft.com/office/drawing/2014/main" id="{7A541463-7D81-6827-F0ED-75602B4BE29B}"/>
-              </a:ext>
-            </a:extLst>
-          </p:cNvPr>
-          <p:cNvSpPr>
-            <a:spLocks noGrp="1"/>
-          </p:cNvSpPr>
-          <p:nvPr>
-            <p:ph type="title"/>
-          </p:nvPr>
-        </p:nvSpPr>
-        <p:spPr/>
-        <p:txBody>
-          <a:bodyPr/>
-          <a:lstStyle/>
-          <a:p>
-            <a:r>
-              <a:rPr lang="de-DE" dirty="0"/>
-              <a:t>Key-Handling</a:t>
-            </a:r>
-          </a:p>
-        </p:txBody>
-      </p:sp>
-    </p:spTree>
-    <p:extLst>
-      <p:ext uri="{BB962C8B-B14F-4D97-AF65-F5344CB8AC3E}">
-        <p14:creationId xmlns:p14="http://schemas.microsoft.com/office/powerpoint/2010/main" val="1434731010"/>
-      </p:ext>
-    </p:extLst>
-  </p:cSld>
-  <p:clrMapOvr>
-    <a:masterClrMapping/>
-  </p:clrMapOvr>
-</p:sld>
-</file>
-
-<file path=ppt/slides/slide11.xml><?xml version="1.0" encoding="utf-8"?>
-<p:sld xmlns:a="http://schemas.openxmlformats.org/drawingml/2006/main" xmlns:r="http://schemas.openxmlformats.org/officeDocument/2006/relationships" xmlns:p="http://schemas.openxmlformats.org/presentationml/2006/main">
-  <p:cSld>
-    <p:spTree>
-      <p:nvGrpSpPr>
         <p:cNvPr id="1" name="">
           <a:extLst>
             <a:ext uri="{FF2B5EF4-FFF2-40B4-BE49-F238E27FC236}">
@@ -6898,7 +6983,7 @@
 </p:sld>
 </file>
 
-<file path=ppt/slides/slide12.xml><?xml version="1.0" encoding="utf-8"?>
+<file path=ppt/slides/slide11.xml><?xml version="1.0" encoding="utf-8"?>
 <p:sld xmlns:a="http://schemas.openxmlformats.org/drawingml/2006/main" xmlns:r="http://schemas.openxmlformats.org/officeDocument/2006/relationships" xmlns:p="http://schemas.openxmlformats.org/presentationml/2006/main">
   <p:cSld>
     <p:spTree>
@@ -7072,7 +7157,7 @@
 </p:sld>
 </file>
 
-<file path=ppt/slides/slide13.xml><?xml version="1.0" encoding="utf-8"?>
+<file path=ppt/slides/slide12.xml><?xml version="1.0" encoding="utf-8"?>
 <p:sld xmlns:a="http://schemas.openxmlformats.org/drawingml/2006/main" xmlns:r="http://schemas.openxmlformats.org/officeDocument/2006/relationships" xmlns:p="http://schemas.openxmlformats.org/presentationml/2006/main">
   <p:cSld>
     <p:spTree>
@@ -7194,112 +7279,6 @@
 </file>
 
 <file path=ppt/slides/slide2.xml><?xml version="1.0" encoding="utf-8"?>
-<p:sld xmlns:a="http://schemas.openxmlformats.org/drawingml/2006/main" xmlns:r="http://schemas.openxmlformats.org/officeDocument/2006/relationships" xmlns:p="http://schemas.openxmlformats.org/presentationml/2006/main">
-  <p:cSld>
-    <p:spTree>
-      <p:nvGrpSpPr>
-        <p:cNvPr id="1" name=""/>
-        <p:cNvGrpSpPr/>
-        <p:nvPr/>
-      </p:nvGrpSpPr>
-      <p:grpSpPr>
-        <a:xfrm>
-          <a:off x="0" y="0"/>
-          <a:ext cx="0" cy="0"/>
-          <a:chOff x="0" y="0"/>
-          <a:chExt cx="0" cy="0"/>
-        </a:xfrm>
-      </p:grpSpPr>
-      <p:sp>
-        <p:nvSpPr>
-          <p:cNvPr id="2" name="Inhaltsplatzhalter 1">
-            <a:extLst>
-              <a:ext uri="{FF2B5EF4-FFF2-40B4-BE49-F238E27FC236}">
-                <a16:creationId xmlns:a16="http://schemas.microsoft.com/office/drawing/2014/main" id="{3B8D86E5-58A5-4648-83F9-AB8591A64F51}"/>
-              </a:ext>
-            </a:extLst>
-          </p:cNvPr>
-          <p:cNvSpPr>
-            <a:spLocks noGrp="1"/>
-          </p:cNvSpPr>
-          <p:nvPr>
-            <p:ph idx="1"/>
-          </p:nvPr>
-        </p:nvSpPr>
-        <p:spPr/>
-        <p:txBody>
-          <a:bodyPr/>
-          <a:lstStyle/>
-          <a:p>
-            <a:pPr>
-              <a:buFont typeface="Arial" panose="020B0604020202020204" pitchFamily="34" charset="0"/>
-              <a:buChar char="•"/>
-            </a:pPr>
-            <a:r>
-              <a:rPr lang="de-DE" dirty="0">
-                <a:latin typeface="+mn-lt"/>
-              </a:rPr>
-              <a:t>Überblick über Tune Scout</a:t>
-            </a:r>
-          </a:p>
-          <a:p>
-            <a:pPr>
-              <a:buFont typeface="Arial" panose="020B0604020202020204" pitchFamily="34" charset="0"/>
-              <a:buChar char="•"/>
-            </a:pPr>
-            <a:r>
-              <a:rPr lang="de-DE" dirty="0">
-                <a:latin typeface="+mn-lt"/>
-              </a:rPr>
-              <a:t>Technischer Stack</a:t>
-            </a:r>
-          </a:p>
-        </p:txBody>
-      </p:sp>
-      <p:sp>
-        <p:nvSpPr>
-          <p:cNvPr id="3" name="Titel 2">
-            <a:extLst>
-              <a:ext uri="{FF2B5EF4-FFF2-40B4-BE49-F238E27FC236}">
-                <a16:creationId xmlns:a16="http://schemas.microsoft.com/office/drawing/2014/main" id="{BF67E93D-6B90-6F4E-AD42-B542B46B245B}"/>
-              </a:ext>
-            </a:extLst>
-          </p:cNvPr>
-          <p:cNvSpPr>
-            <a:spLocks noGrp="1"/>
-          </p:cNvSpPr>
-          <p:nvPr>
-            <p:ph type="title"/>
-          </p:nvPr>
-        </p:nvSpPr>
-        <p:spPr/>
-        <p:txBody>
-          <a:bodyPr/>
-          <a:lstStyle/>
-          <a:p>
-            <a:r>
-              <a:rPr lang="de-DE" dirty="0">
-                <a:latin typeface="+mj-lt"/>
-              </a:rPr>
-              <a:t>Agenda</a:t>
-            </a:r>
-          </a:p>
-        </p:txBody>
-      </p:sp>
-    </p:spTree>
-    <p:extLst>
-      <p:ext uri="{BB962C8B-B14F-4D97-AF65-F5344CB8AC3E}">
-        <p14:creationId xmlns:p14="http://schemas.microsoft.com/office/powerpoint/2010/main" val="3113268514"/>
-      </p:ext>
-    </p:extLst>
-  </p:cSld>
-  <p:clrMapOvr>
-    <a:masterClrMapping/>
-  </p:clrMapOvr>
-</p:sld>
-</file>
-
-<file path=ppt/slides/slide3.xml><?xml version="1.0" encoding="utf-8"?>
 <p:sld xmlns:a="http://schemas.openxmlformats.org/drawingml/2006/main" xmlns:r="http://schemas.openxmlformats.org/officeDocument/2006/relationships" xmlns:p="http://schemas.openxmlformats.org/presentationml/2006/main">
   <p:cSld>
     <p:spTree>
@@ -7483,7 +7462,7 @@
 </p:sld>
 </file>
 
-<file path=ppt/slides/slide4.xml><?xml version="1.0" encoding="utf-8"?>
+<file path=ppt/slides/slide3.xml><?xml version="1.0" encoding="utf-8"?>
 <p:sld xmlns:a="http://schemas.openxmlformats.org/drawingml/2006/main" xmlns:r="http://schemas.openxmlformats.org/officeDocument/2006/relationships" xmlns:p="http://schemas.openxmlformats.org/presentationml/2006/main">
   <p:cSld>
     <p:spTree>
@@ -7786,33 +7765,21 @@
               </a:rPr>
               <a:t>DynamoDB</a:t>
             </a:r>
+            <a:endParaRPr lang="de-DE" b="1" dirty="0">
+              <a:latin typeface="+mn-lt"/>
+            </a:endParaRPr>
+          </a:p>
+          <a:p>
+            <a:pPr marL="742950" lvl="1" indent="-285750"/>
             <a:r>
               <a:rPr lang="de-DE" b="1" dirty="0">
                 <a:latin typeface="+mn-lt"/>
               </a:rPr>
-              <a:t>: </a:t>
-            </a:r>
-            <a:r>
-              <a:rPr lang="de-DE" dirty="0">
-                <a:latin typeface="+mn-lt"/>
-              </a:rPr>
-              <a:t>Speicherung von Metadaten und Fingerprints.</a:t>
-            </a:r>
-          </a:p>
-          <a:p>
-            <a:pPr marL="742950" lvl="1" indent="-285750"/>
-            <a:r>
-              <a:rPr lang="de-DE" b="1" dirty="0">
-                <a:latin typeface="+mn-lt"/>
-              </a:rPr>
-              <a:t>Amazon S3:</a:t>
-            </a:r>
-            <a:r>
-              <a:rPr lang="de-DE" dirty="0">
-                <a:latin typeface="+mn-lt"/>
-              </a:rPr>
-              <a:t> Verwaltung der Audiodateien und Streaming.</a:t>
-            </a:r>
+              <a:t>Amazon S3</a:t>
+            </a:r>
+            <a:endParaRPr lang="de-DE" dirty="0">
+              <a:latin typeface="+mn-lt"/>
+            </a:endParaRPr>
           </a:p>
         </p:txBody>
       </p:sp>
@@ -7829,7 +7796,7 @@
 </p:sld>
 </file>
 
-<file path=ppt/slides/slide5.xml><?xml version="1.0" encoding="utf-8"?>
+<file path=ppt/slides/slide4.xml><?xml version="1.0" encoding="utf-8"?>
 <p:sld xmlns:a="http://schemas.openxmlformats.org/drawingml/2006/main" xmlns:r="http://schemas.openxmlformats.org/officeDocument/2006/relationships" xmlns:p="http://schemas.openxmlformats.org/presentationml/2006/main">
   <p:cSld>
     <p:spTree>
@@ -7862,7 +7829,7 @@
             <p:ph idx="1"/>
             <p:extLst>
               <p:ext uri="{D42A27DB-BD31-4B8C-83A1-F6EECF244321}">
-                <p14:modId xmlns:p14="http://schemas.microsoft.com/office/powerpoint/2010/main" val="1998708533"/>
+                <p14:modId xmlns:p14="http://schemas.microsoft.com/office/powerpoint/2010/main" val="2891691820"/>
               </p:ext>
             </p:extLst>
           </p:nvPr>
@@ -7918,7 +7885,7 @@
 </p:sld>
 </file>
 
-<file path=ppt/slides/slide6.xml><?xml version="1.0" encoding="utf-8"?>
+<file path=ppt/slides/slide5.xml><?xml version="1.0" encoding="utf-8"?>
 <p:sld xmlns:a="http://schemas.openxmlformats.org/drawingml/2006/main" xmlns:r="http://schemas.openxmlformats.org/officeDocument/2006/relationships" xmlns:p="http://schemas.openxmlformats.org/presentationml/2006/main">
   <p:cSld>
     <p:spTree>
@@ -7974,7 +7941,7 @@
               <a:rPr lang="de-DE" b="1" dirty="0">
                 <a:latin typeface="+mn-lt"/>
               </a:rPr>
-              <a:t>1. Audioverarbeitungsmodul</a:t>
+              <a:t>1. Audioverarbeitung</a:t>
             </a:r>
             <a:endParaRPr lang="de-DE" dirty="0">
               <a:latin typeface="+mn-lt"/>
@@ -8007,13 +7974,7 @@
               <a:rPr lang="de-DE" b="1" dirty="0">
                 <a:latin typeface="+mn-lt"/>
               </a:rPr>
-              <a:t>Live-Audioaufnahme: </a:t>
-            </a:r>
-            <a:r>
-              <a:rPr lang="de-DE" dirty="0">
-                <a:latin typeface="+mn-lt"/>
-              </a:rPr>
-              <a:t>Ermöglicht Echtzeitaufnahmen zur direkten Analyse und Vergleiche.</a:t>
+              <a:t>Live-Audioaufnahme</a:t>
             </a:r>
           </a:p>
           <a:p>
@@ -8025,13 +7986,7 @@
               <a:rPr lang="de-DE" b="1" dirty="0">
                 <a:latin typeface="+mn-lt"/>
               </a:rPr>
-              <a:t>MP3- und WAV-Unterstützung: </a:t>
-            </a:r>
-            <a:r>
-              <a:rPr lang="de-DE" dirty="0">
-                <a:latin typeface="+mn-lt"/>
-              </a:rPr>
-              <a:t>Verarbeitet gängige Audioformate für maximale Kompatibilität.</a:t>
+              <a:t>Upload</a:t>
             </a:r>
           </a:p>
           <a:p>
@@ -8043,14 +7998,32 @@
               <a:rPr lang="de-DE" b="1" dirty="0">
                 <a:latin typeface="+mn-lt"/>
               </a:rPr>
-              <a:t>Datenaufbereitung: </a:t>
-            </a:r>
-            <a:r>
-              <a:rPr lang="de-DE" dirty="0">
+              <a:t>MP3- und WAV-Unterstützung</a:t>
+            </a:r>
+            <a:endParaRPr lang="de-DE" dirty="0">
+              <a:latin typeface="+mn-lt"/>
+            </a:endParaRPr>
+          </a:p>
+          <a:p>
+            <a:pPr marL="742950" lvl="1" indent="-285750">
+              <a:buFont typeface="Arial" panose="020B0604020202020204" pitchFamily="34" charset="0"/>
+              <a:buChar char="•"/>
+            </a:pPr>
+            <a:r>
+              <a:rPr lang="de-DE" b="1" dirty="0">
                 <a:latin typeface="+mn-lt"/>
               </a:rPr>
-              <a:t>Speichert Audiodaten im WAV-Format für Fingerprinting und Equalizer.</a:t>
-            </a:r>
+              <a:t>Datenaufbereitung</a:t>
+            </a:r>
+          </a:p>
+          <a:p>
+            <a:pPr marL="742950" lvl="1" indent="-285750">
+              <a:buFont typeface="Arial" panose="020B0604020202020204" pitchFamily="34" charset="0"/>
+              <a:buChar char="•"/>
+            </a:pPr>
+            <a:endParaRPr lang="de-DE" dirty="0">
+              <a:latin typeface="+mn-lt"/>
+            </a:endParaRPr>
           </a:p>
         </p:txBody>
       </p:sp>
@@ -8097,7 +8070,7 @@
 </p:sld>
 </file>
 
-<file path=ppt/slides/slide7.xml><?xml version="1.0" encoding="utf-8"?>
+<file path=ppt/slides/slide6.xml><?xml version="1.0" encoding="utf-8"?>
 <p:sld xmlns:a="http://schemas.openxmlformats.org/drawingml/2006/main" xmlns:r="http://schemas.openxmlformats.org/officeDocument/2006/relationships" xmlns:p="http://schemas.openxmlformats.org/presentationml/2006/main">
   <p:cSld>
     <p:spTree>
@@ -8156,12 +8129,6 @@
               </a:rPr>
               <a:t>Hashing</a:t>
             </a:r>
-            <a:r>
-              <a:rPr lang="de-DE" b="1" dirty="0">
-                <a:latin typeface="+mn-lt"/>
-              </a:rPr>
-              <a:t>-Modul</a:t>
-            </a:r>
             <a:endParaRPr lang="de-DE" dirty="0">
               <a:latin typeface="+mn-lt"/>
             </a:endParaRPr>
@@ -8193,13 +8160,19 @@
               <a:rPr lang="de-DE" b="1" dirty="0">
                 <a:latin typeface="+mn-lt"/>
               </a:rPr>
-              <a:t>Audio-Fingerprinting: </a:t>
-            </a:r>
-            <a:r>
-              <a:rPr lang="de-DE" dirty="0">
+              <a:t>Audio-Fingerprinting (</a:t>
+            </a:r>
+            <a:r>
+              <a:rPr lang="de-DE" b="1" dirty="0" err="1">
                 <a:latin typeface="+mn-lt"/>
               </a:rPr>
-              <a:t>Erstellt eindeutige SHA-256-Hashes für WAV- und MP3-Dateien.</a:t>
+              <a:t>Hashlib</a:t>
+            </a:r>
+            <a:r>
+              <a:rPr lang="de-DE" b="1" dirty="0">
+                <a:latin typeface="+mn-lt"/>
+              </a:rPr>
+              <a:t>)</a:t>
             </a:r>
           </a:p>
           <a:p>
@@ -8211,14 +8184,11 @@
               <a:rPr lang="de-DE" b="1" dirty="0">
                 <a:latin typeface="+mn-lt"/>
               </a:rPr>
-              <a:t>Metadatenintegration: </a:t>
-            </a:r>
-            <a:r>
-              <a:rPr lang="de-DE" dirty="0">
-                <a:latin typeface="+mn-lt"/>
-              </a:rPr>
-              <a:t>Verknüpft Hashes mit Song-ID, Titel, Künstler und Album.</a:t>
-            </a:r>
+              <a:t>Metadatenintegration</a:t>
+            </a:r>
+            <a:endParaRPr lang="de-DE" dirty="0">
+              <a:latin typeface="+mn-lt"/>
+            </a:endParaRPr>
           </a:p>
         </p:txBody>
       </p:sp>
@@ -8265,7 +8235,7 @@
 </p:sld>
 </file>
 
-<file path=ppt/slides/slide8.xml><?xml version="1.0" encoding="utf-8"?>
+<file path=ppt/slides/slide7.xml><?xml version="1.0" encoding="utf-8"?>
 <p:sld xmlns:a="http://schemas.openxmlformats.org/drawingml/2006/main" xmlns:r="http://schemas.openxmlformats.org/officeDocument/2006/relationships" xmlns:p="http://schemas.openxmlformats.org/presentationml/2006/main">
   <p:cSld>
     <p:spTree>
@@ -8339,26 +8309,26 @@
               <a:buChar char="•"/>
             </a:pPr>
             <a:r>
-              <a:rPr lang="de-DE" b="1" dirty="0" err="1">
+              <a:rPr lang="de-DE" b="1" dirty="0">
                 <a:latin typeface="+mn-lt"/>
               </a:rPr>
-              <a:t>Duplikaterkennung</a:t>
-            </a:r>
-            <a:endParaRPr lang="de-DE" b="1" dirty="0">
-              <a:latin typeface="+mn-lt"/>
-            </a:endParaRPr>
+              <a:t>Speicherung der Daten</a:t>
+            </a:r>
+          </a:p>
+          <a:p>
+            <a:pPr marL="742950" lvl="1" indent="-285750"/>
+            <a:r>
+              <a:rPr lang="de-DE" b="1" dirty="0">
+                <a:latin typeface="+mn-lt"/>
+              </a:rPr>
+              <a:t>Duplikat-Erkennung</a:t>
+            </a:r>
           </a:p>
           <a:p>
             <a:pPr marL="742950" lvl="1" indent="-285750">
               <a:buFont typeface="Arial" panose="020B0604020202020204" pitchFamily="34" charset="0"/>
               <a:buChar char="•"/>
             </a:pPr>
-            <a:r>
-              <a:rPr lang="de-DE" b="1" dirty="0">
-                <a:latin typeface="+mn-lt"/>
-              </a:rPr>
-              <a:t>Speicherung der Daten</a:t>
-            </a:r>
             <a:endParaRPr lang="de-DE" dirty="0">
               <a:latin typeface="+mn-lt"/>
             </a:endParaRPr>
@@ -8436,7 +8406,7 @@
 </p:sld>
 </file>
 
-<file path=ppt/slides/slide9.xml><?xml version="1.0" encoding="utf-8"?>
+<file path=ppt/slides/slide8.xml><?xml version="1.0" encoding="utf-8"?>
 <p:sld xmlns:a="http://schemas.openxmlformats.org/drawingml/2006/main" xmlns:r="http://schemas.openxmlformats.org/officeDocument/2006/relationships" xmlns:p="http://schemas.openxmlformats.org/presentationml/2006/main">
   <p:cSld>
     <p:spTree>
@@ -8584,6 +8554,119 @@
     <p:extLst>
       <p:ext uri="{BB962C8B-B14F-4D97-AF65-F5344CB8AC3E}">
         <p14:creationId xmlns:p14="http://schemas.microsoft.com/office/powerpoint/2010/main" val="1945662299"/>
+      </p:ext>
+    </p:extLst>
+  </p:cSld>
+  <p:clrMapOvr>
+    <a:masterClrMapping/>
+  </p:clrMapOvr>
+</p:sld>
+</file>
+
+<file path=ppt/slides/slide9.xml><?xml version="1.0" encoding="utf-8"?>
+<p:sld xmlns:a="http://schemas.openxmlformats.org/drawingml/2006/main" xmlns:r="http://schemas.openxmlformats.org/officeDocument/2006/relationships" xmlns:p="http://schemas.openxmlformats.org/presentationml/2006/main">
+  <p:cSld>
+    <p:spTree>
+      <p:nvGrpSpPr>
+        <p:cNvPr id="1" name=""/>
+        <p:cNvGrpSpPr/>
+        <p:nvPr/>
+      </p:nvGrpSpPr>
+      <p:grpSpPr>
+        <a:xfrm>
+          <a:off x="0" y="0"/>
+          <a:ext cx="0" cy="0"/>
+          <a:chOff x="0" y="0"/>
+          <a:chExt cx="0" cy="0"/>
+        </a:xfrm>
+      </p:grpSpPr>
+      <p:sp>
+        <p:nvSpPr>
+          <p:cNvPr id="2" name="Inhaltsplatzhalter 1">
+            <a:extLst>
+              <a:ext uri="{FF2B5EF4-FFF2-40B4-BE49-F238E27FC236}">
+                <a16:creationId xmlns:a16="http://schemas.microsoft.com/office/drawing/2014/main" id="{AD7D2038-7134-1234-8267-584524B9C159}"/>
+              </a:ext>
+            </a:extLst>
+          </p:cNvPr>
+          <p:cNvSpPr>
+            <a:spLocks noGrp="1"/>
+          </p:cNvSpPr>
+          <p:nvPr>
+            <p:ph idx="1"/>
+          </p:nvPr>
+        </p:nvSpPr>
+        <p:spPr/>
+        <p:txBody>
+          <a:bodyPr/>
+          <a:lstStyle/>
+          <a:p>
+            <a:r>
+              <a:rPr lang="de-DE" dirty="0"/>
+              <a:t>Admin Keys -&gt; lokal gespeichert</a:t>
+            </a:r>
+          </a:p>
+          <a:p>
+            <a:r>
+              <a:rPr lang="de-DE" dirty="0" err="1"/>
+              <a:t>Settings.toml</a:t>
+            </a:r>
+            <a:r>
+              <a:rPr lang="de-DE" dirty="0"/>
+              <a:t> alle Informationen gespeichert</a:t>
+            </a:r>
+          </a:p>
+          <a:p>
+            <a:r>
+              <a:rPr lang="de-DE" dirty="0"/>
+              <a:t>In .</a:t>
+            </a:r>
+            <a:r>
+              <a:rPr lang="de-DE" dirty="0" err="1"/>
+              <a:t>gitignore</a:t>
+            </a:r>
+            <a:r>
+              <a:rPr lang="de-DE" dirty="0"/>
+              <a:t> eingebunden</a:t>
+            </a:r>
+          </a:p>
+          <a:p>
+            <a:endParaRPr lang="de-DE" dirty="0"/>
+          </a:p>
+        </p:txBody>
+      </p:sp>
+      <p:sp>
+        <p:nvSpPr>
+          <p:cNvPr id="3" name="Titel 2">
+            <a:extLst>
+              <a:ext uri="{FF2B5EF4-FFF2-40B4-BE49-F238E27FC236}">
+                <a16:creationId xmlns:a16="http://schemas.microsoft.com/office/drawing/2014/main" id="{7A541463-7D81-6827-F0ED-75602B4BE29B}"/>
+              </a:ext>
+            </a:extLst>
+          </p:cNvPr>
+          <p:cNvSpPr>
+            <a:spLocks noGrp="1"/>
+          </p:cNvSpPr>
+          <p:nvPr>
+            <p:ph type="title"/>
+          </p:nvPr>
+        </p:nvSpPr>
+        <p:spPr/>
+        <p:txBody>
+          <a:bodyPr/>
+          <a:lstStyle/>
+          <a:p>
+            <a:r>
+              <a:rPr lang="de-DE" dirty="0"/>
+              <a:t>Key-Handling</a:t>
+            </a:r>
+          </a:p>
+        </p:txBody>
+      </p:sp>
+    </p:spTree>
+    <p:extLst>
+      <p:ext uri="{BB962C8B-B14F-4D97-AF65-F5344CB8AC3E}">
+        <p14:creationId xmlns:p14="http://schemas.microsoft.com/office/powerpoint/2010/main" val="1434731010"/>
       </p:ext>
     </p:extLst>
   </p:cSld>

</xml_diff>